<commit_message>
Add python 3.10 presentation
</commit_message>
<xml_diff>
--- a/python_packaging_2021/PythonPackagingIn2021.pptx
+++ b/python_packaging_2021/PythonPackagingIn2021.pptx
@@ -5,7 +5,7 @@
     <p:sldMasterId id="2147483952" r:id="rId1"/>
   </p:sldMasterIdLst>
   <p:notesMasterIdLst>
-    <p:notesMasterId r:id="rId29"/>
+    <p:notesMasterId r:id="rId30"/>
   </p:notesMasterIdLst>
   <p:sldIdLst>
     <p:sldId id="256" r:id="rId2"/>
@@ -31,43 +31,44 @@
     <p:sldId id="298" r:id="rId22"/>
     <p:sldId id="314" r:id="rId23"/>
     <p:sldId id="302" r:id="rId24"/>
-    <p:sldId id="312" r:id="rId25"/>
-    <p:sldId id="303" r:id="rId26"/>
-    <p:sldId id="313" r:id="rId27"/>
-    <p:sldId id="316" r:id="rId28"/>
+    <p:sldId id="318" r:id="rId25"/>
+    <p:sldId id="312" r:id="rId26"/>
+    <p:sldId id="303" r:id="rId27"/>
+    <p:sldId id="313" r:id="rId28"/>
+    <p:sldId id="316" r:id="rId29"/>
   </p:sldIdLst>
   <p:sldSz cx="9144000" cy="5143500" type="screen16x9"/>
   <p:notesSz cx="6858000" cy="9144000"/>
   <p:embeddedFontLst>
     <p:embeddedFont>
       <p:font typeface="Roboto" panose="020B0604020202020204" charset="0"/>
-      <p:regular r:id="rId30"/>
-      <p:bold r:id="rId31"/>
-      <p:italic r:id="rId32"/>
-      <p:boldItalic r:id="rId33"/>
+      <p:regular r:id="rId31"/>
+      <p:bold r:id="rId32"/>
+      <p:italic r:id="rId33"/>
+      <p:boldItalic r:id="rId34"/>
     </p:embeddedFont>
     <p:embeddedFont>
       <p:font typeface="Roboto Thin" panose="020B0604020202020204" charset="0"/>
-      <p:regular r:id="rId34"/>
-      <p:bold r:id="rId35"/>
-      <p:italic r:id="rId36"/>
-      <p:boldItalic r:id="rId37"/>
+      <p:regular r:id="rId35"/>
+      <p:bold r:id="rId36"/>
+      <p:italic r:id="rId37"/>
+      <p:boldItalic r:id="rId38"/>
     </p:embeddedFont>
     <p:embeddedFont>
       <p:font typeface="Tw Cen MT" panose="020B0602020104020603" pitchFamily="34" charset="0"/>
-      <p:regular r:id="rId38"/>
-      <p:bold r:id="rId39"/>
-      <p:italic r:id="rId40"/>
-      <p:boldItalic r:id="rId41"/>
+      <p:regular r:id="rId39"/>
+      <p:bold r:id="rId40"/>
+      <p:italic r:id="rId41"/>
+      <p:boldItalic r:id="rId42"/>
     </p:embeddedFont>
     <p:embeddedFont>
       <p:font typeface="Tw Cen MT Condensed" panose="020B0606020104020203" pitchFamily="34" charset="0"/>
-      <p:regular r:id="rId42"/>
-      <p:bold r:id="rId43"/>
+      <p:regular r:id="rId43"/>
+      <p:bold r:id="rId44"/>
     </p:embeddedFont>
     <p:embeddedFont>
       <p:font typeface="Wingdings 3" panose="05040102010807070707" pitchFamily="18" charset="2"/>
-      <p:regular r:id="rId44"/>
+      <p:regular r:id="rId45"/>
     </p:embeddedFont>
   </p:embeddedFontLst>
   <p:defaultTextStyle>
@@ -171,6 +172,32 @@
     </p:ext>
   </p:extLst>
 </p:presentation>
+</file>
+
+<file path=ppt/commentAuthors.xml><?xml version="1.0" encoding="utf-8"?>
+<p:cmAuthorLst xmlns:a="http://schemas.openxmlformats.org/drawingml/2006/main" xmlns:r="http://schemas.openxmlformats.org/officeDocument/2006/relationships" xmlns:p="http://schemas.openxmlformats.org/presentationml/2006/main">
+  <p:cmAuthor id="1" name="Alex PRENGERE" initials="AP" lastIdx="1" clrIdx="0">
+    <p:extLst>
+      <p:ext uri="{19B8F6BF-5375-455C-9EA6-DF929625EA0E}">
+        <p15:presenceInfo xmlns:p15="http://schemas.microsoft.com/office/powerpoint/2012/main" userId="Alex PRENGERE" providerId="None"/>
+      </p:ext>
+    </p:extLst>
+  </p:cmAuthor>
+</p:cmAuthorLst>
+</file>
+
+<file path=ppt/comments/comment1.xml><?xml version="1.0" encoding="utf-8"?>
+<p:cmLst xmlns:a="http://schemas.openxmlformats.org/drawingml/2006/main" xmlns:r="http://schemas.openxmlformats.org/officeDocument/2006/relationships" xmlns:p="http://schemas.openxmlformats.org/presentationml/2006/main">
+  <p:cm authorId="1" dt="2021-10-25T11:29:47.890" idx="1">
+    <p:pos x="5159" y="886"/>
+    <p:text/>
+    <p:extLst>
+      <p:ext uri="{C676402C-5697-4E1C-873F-D02D1690AC5C}">
+        <p15:threadingInfo xmlns:p15="http://schemas.microsoft.com/office/powerpoint/2012/main" timeZoneBias="-120"/>
+      </p:ext>
+    </p:extLst>
+  </p:cm>
+</p:cmLst>
 </file>
 
 <file path=ppt/notesMasters/notesMaster1.xml><?xml version="1.0" encoding="utf-8"?>
@@ -2433,6 +2460,115 @@
   <p:cSld>
     <p:spTree>
       <p:nvGrpSpPr>
+        <p:cNvPr id="1" name="Shape 118"/>
+        <p:cNvGrpSpPr/>
+        <p:nvPr/>
+      </p:nvGrpSpPr>
+      <p:grpSpPr>
+        <a:xfrm>
+          <a:off x="0" y="0"/>
+          <a:ext cx="0" cy="0"/>
+          <a:chOff x="0" y="0"/>
+          <a:chExt cx="0" cy="0"/>
+        </a:xfrm>
+      </p:grpSpPr>
+      <p:sp>
+        <p:nvSpPr>
+          <p:cNvPr id="119" name="Google Shape;119;gd37e73d60d_0_17:notes"/>
+          <p:cNvSpPr>
+            <a:spLocks noGrp="1" noRot="1" noChangeAspect="1"/>
+          </p:cNvSpPr>
+          <p:nvPr>
+            <p:ph type="sldImg" idx="2"/>
+          </p:nvPr>
+        </p:nvSpPr>
+        <p:spPr>
+          <a:xfrm>
+            <a:off x="381000" y="685800"/>
+            <a:ext cx="6096000" cy="3429000"/>
+          </a:xfrm>
+          <a:custGeom>
+            <a:avLst/>
+            <a:gdLst/>
+            <a:ahLst/>
+            <a:cxnLst/>
+            <a:rect l="l" t="t" r="r" b="b"/>
+            <a:pathLst>
+              <a:path w="120000" h="120000" extrusionOk="0">
+                <a:moveTo>
+                  <a:pt x="0" y="0"/>
+                </a:moveTo>
+                <a:lnTo>
+                  <a:pt x="120000" y="0"/>
+                </a:lnTo>
+                <a:lnTo>
+                  <a:pt x="120000" y="120000"/>
+                </a:lnTo>
+                <a:lnTo>
+                  <a:pt x="0" y="120000"/>
+                </a:lnTo>
+                <a:close/>
+              </a:path>
+            </a:pathLst>
+          </a:custGeom>
+        </p:spPr>
+      </p:sp>
+      <p:sp>
+        <p:nvSpPr>
+          <p:cNvPr id="120" name="Google Shape;120;gd37e73d60d_0_17:notes"/>
+          <p:cNvSpPr txBox="1">
+            <a:spLocks noGrp="1"/>
+          </p:cNvSpPr>
+          <p:nvPr>
+            <p:ph type="body" idx="1"/>
+          </p:nvPr>
+        </p:nvSpPr>
+        <p:spPr>
+          <a:xfrm>
+            <a:off x="685800" y="4343400"/>
+            <a:ext cx="5486400" cy="4114800"/>
+          </a:xfrm>
+          <a:prstGeom prst="rect">
+            <a:avLst/>
+          </a:prstGeom>
+        </p:spPr>
+        <p:txBody>
+          <a:bodyPr spcFirstLastPara="1" wrap="square" lIns="91425" tIns="91425" rIns="91425" bIns="91425" anchor="t" anchorCtr="0">
+            <a:noAutofit/>
+          </a:bodyPr>
+          <a:lstStyle/>
+          <a:p>
+            <a:pPr marL="0" lvl="0" indent="0" algn="l" rtl="0">
+              <a:spcBef>
+                <a:spcPts val="0"/>
+              </a:spcBef>
+              <a:spcAft>
+                <a:spcPts val="0"/>
+              </a:spcAft>
+              <a:buNone/>
+            </a:pPr>
+            <a:endParaRPr/>
+          </a:p>
+        </p:txBody>
+      </p:sp>
+    </p:spTree>
+    <p:extLst>
+      <p:ext uri="{BB962C8B-B14F-4D97-AF65-F5344CB8AC3E}">
+        <p14:creationId xmlns:p14="http://schemas.microsoft.com/office/powerpoint/2010/main" val="3270287953"/>
+      </p:ext>
+    </p:extLst>
+  </p:cSld>
+  <p:clrMapOvr>
+    <a:masterClrMapping/>
+  </p:clrMapOvr>
+</p:notes>
+</file>
+
+<file path=ppt/notesSlides/notesSlide25.xml><?xml version="1.0" encoding="utf-8"?>
+<p:notes xmlns:a="http://schemas.openxmlformats.org/drawingml/2006/main" xmlns:r="http://schemas.openxmlformats.org/officeDocument/2006/relationships" xmlns:p="http://schemas.openxmlformats.org/presentationml/2006/main" showMasterSp="0" showMasterPhAnim="0">
+  <p:cSld>
+    <p:spTree>
+      <p:nvGrpSpPr>
         <p:cNvPr id="1" name="Shape 206"/>
         <p:cNvGrpSpPr/>
         <p:nvPr/>
@@ -2528,115 +2664,6 @@
     <p:extLst>
       <p:ext uri="{BB962C8B-B14F-4D97-AF65-F5344CB8AC3E}">
         <p14:creationId xmlns:p14="http://schemas.microsoft.com/office/powerpoint/2010/main" val="1914294047"/>
-      </p:ext>
-    </p:extLst>
-  </p:cSld>
-  <p:clrMapOvr>
-    <a:masterClrMapping/>
-  </p:clrMapOvr>
-</p:notes>
-</file>
-
-<file path=ppt/notesSlides/notesSlide25.xml><?xml version="1.0" encoding="utf-8"?>
-<p:notes xmlns:a="http://schemas.openxmlformats.org/drawingml/2006/main" xmlns:r="http://schemas.openxmlformats.org/officeDocument/2006/relationships" xmlns:p="http://schemas.openxmlformats.org/presentationml/2006/main" showMasterSp="0" showMasterPhAnim="0">
-  <p:cSld>
-    <p:spTree>
-      <p:nvGrpSpPr>
-        <p:cNvPr id="1" name="Shape 118"/>
-        <p:cNvGrpSpPr/>
-        <p:nvPr/>
-      </p:nvGrpSpPr>
-      <p:grpSpPr>
-        <a:xfrm>
-          <a:off x="0" y="0"/>
-          <a:ext cx="0" cy="0"/>
-          <a:chOff x="0" y="0"/>
-          <a:chExt cx="0" cy="0"/>
-        </a:xfrm>
-      </p:grpSpPr>
-      <p:sp>
-        <p:nvSpPr>
-          <p:cNvPr id="119" name="Google Shape;119;gd37e73d60d_0_17:notes"/>
-          <p:cNvSpPr>
-            <a:spLocks noGrp="1" noRot="1" noChangeAspect="1"/>
-          </p:cNvSpPr>
-          <p:nvPr>
-            <p:ph type="sldImg" idx="2"/>
-          </p:nvPr>
-        </p:nvSpPr>
-        <p:spPr>
-          <a:xfrm>
-            <a:off x="381000" y="685800"/>
-            <a:ext cx="6096000" cy="3429000"/>
-          </a:xfrm>
-          <a:custGeom>
-            <a:avLst/>
-            <a:gdLst/>
-            <a:ahLst/>
-            <a:cxnLst/>
-            <a:rect l="l" t="t" r="r" b="b"/>
-            <a:pathLst>
-              <a:path w="120000" h="120000" extrusionOk="0">
-                <a:moveTo>
-                  <a:pt x="0" y="0"/>
-                </a:moveTo>
-                <a:lnTo>
-                  <a:pt x="120000" y="0"/>
-                </a:lnTo>
-                <a:lnTo>
-                  <a:pt x="120000" y="120000"/>
-                </a:lnTo>
-                <a:lnTo>
-                  <a:pt x="0" y="120000"/>
-                </a:lnTo>
-                <a:close/>
-              </a:path>
-            </a:pathLst>
-          </a:custGeom>
-        </p:spPr>
-      </p:sp>
-      <p:sp>
-        <p:nvSpPr>
-          <p:cNvPr id="120" name="Google Shape;120;gd37e73d60d_0_17:notes"/>
-          <p:cNvSpPr txBox="1">
-            <a:spLocks noGrp="1"/>
-          </p:cNvSpPr>
-          <p:nvPr>
-            <p:ph type="body" idx="1"/>
-          </p:nvPr>
-        </p:nvSpPr>
-        <p:spPr>
-          <a:xfrm>
-            <a:off x="685800" y="4343400"/>
-            <a:ext cx="5486400" cy="4114800"/>
-          </a:xfrm>
-          <a:prstGeom prst="rect">
-            <a:avLst/>
-          </a:prstGeom>
-        </p:spPr>
-        <p:txBody>
-          <a:bodyPr spcFirstLastPara="1" wrap="square" lIns="91425" tIns="91425" rIns="91425" bIns="91425" anchor="t" anchorCtr="0">
-            <a:noAutofit/>
-          </a:bodyPr>
-          <a:lstStyle/>
-          <a:p>
-            <a:pPr marL="0" lvl="0" indent="0" algn="l" rtl="0">
-              <a:spcBef>
-                <a:spcPts val="0"/>
-              </a:spcBef>
-              <a:spcAft>
-                <a:spcPts val="0"/>
-              </a:spcAft>
-              <a:buNone/>
-            </a:pPr>
-            <a:endParaRPr/>
-          </a:p>
-        </p:txBody>
-      </p:sp>
-    </p:spTree>
-    <p:extLst>
-      <p:ext uri="{BB962C8B-B14F-4D97-AF65-F5344CB8AC3E}">
-        <p14:creationId xmlns:p14="http://schemas.microsoft.com/office/powerpoint/2010/main" val="2398785967"/>
       </p:ext>
     </p:extLst>
   </p:cSld>
@@ -2745,6 +2772,115 @@
     </p:spTree>
     <p:extLst>
       <p:ext uri="{BB962C8B-B14F-4D97-AF65-F5344CB8AC3E}">
+        <p14:creationId xmlns:p14="http://schemas.microsoft.com/office/powerpoint/2010/main" val="2398785967"/>
+      </p:ext>
+    </p:extLst>
+  </p:cSld>
+  <p:clrMapOvr>
+    <a:masterClrMapping/>
+  </p:clrMapOvr>
+</p:notes>
+</file>
+
+<file path=ppt/notesSlides/notesSlide27.xml><?xml version="1.0" encoding="utf-8"?>
+<p:notes xmlns:a="http://schemas.openxmlformats.org/drawingml/2006/main" xmlns:r="http://schemas.openxmlformats.org/officeDocument/2006/relationships" xmlns:p="http://schemas.openxmlformats.org/presentationml/2006/main" showMasterSp="0" showMasterPhAnim="0">
+  <p:cSld>
+    <p:spTree>
+      <p:nvGrpSpPr>
+        <p:cNvPr id="1" name="Shape 118"/>
+        <p:cNvGrpSpPr/>
+        <p:nvPr/>
+      </p:nvGrpSpPr>
+      <p:grpSpPr>
+        <a:xfrm>
+          <a:off x="0" y="0"/>
+          <a:ext cx="0" cy="0"/>
+          <a:chOff x="0" y="0"/>
+          <a:chExt cx="0" cy="0"/>
+        </a:xfrm>
+      </p:grpSpPr>
+      <p:sp>
+        <p:nvSpPr>
+          <p:cNvPr id="119" name="Google Shape;119;gd37e73d60d_0_17:notes"/>
+          <p:cNvSpPr>
+            <a:spLocks noGrp="1" noRot="1" noChangeAspect="1"/>
+          </p:cNvSpPr>
+          <p:nvPr>
+            <p:ph type="sldImg" idx="2"/>
+          </p:nvPr>
+        </p:nvSpPr>
+        <p:spPr>
+          <a:xfrm>
+            <a:off x="381000" y="685800"/>
+            <a:ext cx="6096000" cy="3429000"/>
+          </a:xfrm>
+          <a:custGeom>
+            <a:avLst/>
+            <a:gdLst/>
+            <a:ahLst/>
+            <a:cxnLst/>
+            <a:rect l="l" t="t" r="r" b="b"/>
+            <a:pathLst>
+              <a:path w="120000" h="120000" extrusionOk="0">
+                <a:moveTo>
+                  <a:pt x="0" y="0"/>
+                </a:moveTo>
+                <a:lnTo>
+                  <a:pt x="120000" y="0"/>
+                </a:lnTo>
+                <a:lnTo>
+                  <a:pt x="120000" y="120000"/>
+                </a:lnTo>
+                <a:lnTo>
+                  <a:pt x="0" y="120000"/>
+                </a:lnTo>
+                <a:close/>
+              </a:path>
+            </a:pathLst>
+          </a:custGeom>
+        </p:spPr>
+      </p:sp>
+      <p:sp>
+        <p:nvSpPr>
+          <p:cNvPr id="120" name="Google Shape;120;gd37e73d60d_0_17:notes"/>
+          <p:cNvSpPr txBox="1">
+            <a:spLocks noGrp="1"/>
+          </p:cNvSpPr>
+          <p:nvPr>
+            <p:ph type="body" idx="1"/>
+          </p:nvPr>
+        </p:nvSpPr>
+        <p:spPr>
+          <a:xfrm>
+            <a:off x="685800" y="4343400"/>
+            <a:ext cx="5486400" cy="4114800"/>
+          </a:xfrm>
+          <a:prstGeom prst="rect">
+            <a:avLst/>
+          </a:prstGeom>
+        </p:spPr>
+        <p:txBody>
+          <a:bodyPr spcFirstLastPara="1" wrap="square" lIns="91425" tIns="91425" rIns="91425" bIns="91425" anchor="t" anchorCtr="0">
+            <a:noAutofit/>
+          </a:bodyPr>
+          <a:lstStyle/>
+          <a:p>
+            <a:pPr marL="0" lvl="0" indent="0" algn="l" rtl="0">
+              <a:spcBef>
+                <a:spcPts val="0"/>
+              </a:spcBef>
+              <a:spcAft>
+                <a:spcPts val="0"/>
+              </a:spcAft>
+              <a:buNone/>
+            </a:pPr>
+            <a:endParaRPr/>
+          </a:p>
+        </p:txBody>
+      </p:sp>
+    </p:spTree>
+    <p:extLst>
+      <p:ext uri="{BB962C8B-B14F-4D97-AF65-F5344CB8AC3E}">
         <p14:creationId xmlns:p14="http://schemas.microsoft.com/office/powerpoint/2010/main" val="1511384146"/>
       </p:ext>
     </p:extLst>
@@ -2755,7 +2891,7 @@
 </p:notes>
 </file>
 
-<file path=ppt/notesSlides/notesSlide27.xml><?xml version="1.0" encoding="utf-8"?>
+<file path=ppt/notesSlides/notesSlide28.xml><?xml version="1.0" encoding="utf-8"?>
 <p:notes xmlns:a="http://schemas.openxmlformats.org/drawingml/2006/main" xmlns:r="http://schemas.openxmlformats.org/officeDocument/2006/relationships" xmlns:p="http://schemas.openxmlformats.org/presentationml/2006/main" showMasterSp="0" showMasterPhAnim="0">
   <p:cSld>
     <p:spTree>
@@ -12520,7 +12656,7 @@
             <a:fld id="{B61BEF0D-F0BB-DE4B-95CE-6DB70DBA9567}" type="datetimeFigureOut">
               <a:rPr lang="en-US" smtClean="0"/>
               <a:pPr/>
-              <a:t>6/11/2021</a:t>
+              <a:t>10/25/2021</a:t>
             </a:fld>
             <a:endParaRPr lang="en-US" dirty="0"/>
           </a:p>
@@ -12741,7 +12877,7 @@
           <a:p>
             <a:fld id="{55C6B4A9-1611-4792-9094-5F34BCA07E0B}" type="datetimeFigureOut">
               <a:rPr lang="en-US" smtClean="0"/>
-              <a:t>6/11/2021</a:t>
+              <a:t>10/25/2021</a:t>
             </a:fld>
             <a:endParaRPr lang="en-US" dirty="0"/>
           </a:p>
@@ -12936,7 +13072,7 @@
             <a:fld id="{B61BEF0D-F0BB-DE4B-95CE-6DB70DBA9567}" type="datetimeFigureOut">
               <a:rPr lang="en-US" smtClean="0"/>
               <a:pPr/>
-              <a:t>6/11/2021</a:t>
+              <a:t>10/25/2021</a:t>
             </a:fld>
             <a:endParaRPr lang="en-US" dirty="0"/>
           </a:p>
@@ -14368,7 +14504,7 @@
             <a:fld id="{B61BEF0D-F0BB-DE4B-95CE-6DB70DBA9567}" type="datetimeFigureOut">
               <a:rPr lang="en-US" smtClean="0"/>
               <a:pPr/>
-              <a:t>6/11/2021</a:t>
+              <a:t>10/25/2021</a:t>
             </a:fld>
             <a:endParaRPr lang="en-US" dirty="0"/>
           </a:p>
@@ -23281,7 +23417,7 @@
             <a:fld id="{B61BEF0D-F0BB-DE4B-95CE-6DB70DBA9567}" type="datetimeFigureOut">
               <a:rPr lang="en-US" smtClean="0"/>
               <a:pPr/>
-              <a:t>6/11/2021</a:t>
+              <a:t>10/25/2021</a:t>
             </a:fld>
             <a:endParaRPr lang="en-US" dirty="0"/>
           </a:p>
@@ -23569,7 +23705,7 @@
           <a:p>
             <a:fld id="{EB712588-04B1-427B-82EE-E8DB90309F08}" type="datetimeFigureOut">
               <a:rPr lang="en-US" smtClean="0"/>
-              <a:t>6/11/2021</a:t>
+              <a:t>10/25/2021</a:t>
             </a:fld>
             <a:endParaRPr lang="en-US" dirty="0"/>
           </a:p>
@@ -23982,7 +24118,7 @@
             <a:fld id="{B61BEF0D-F0BB-DE4B-95CE-6DB70DBA9567}" type="datetimeFigureOut">
               <a:rPr lang="en-US" smtClean="0"/>
               <a:pPr/>
-              <a:t>6/11/2021</a:t>
+              <a:t>10/25/2021</a:t>
             </a:fld>
             <a:endParaRPr lang="en-US" dirty="0"/>
           </a:p>
@@ -24115,7 +24251,7 @@
             <a:fld id="{B61BEF0D-F0BB-DE4B-95CE-6DB70DBA9567}" type="datetimeFigureOut">
               <a:rPr lang="en-US" smtClean="0"/>
               <a:pPr/>
-              <a:t>6/11/2021</a:t>
+              <a:t>10/25/2021</a:t>
             </a:fld>
             <a:endParaRPr lang="en-US" dirty="0"/>
           </a:p>
@@ -24225,7 +24361,7 @@
             <a:fld id="{B61BEF0D-F0BB-DE4B-95CE-6DB70DBA9567}" type="datetimeFigureOut">
               <a:rPr lang="en-US" smtClean="0"/>
               <a:pPr/>
-              <a:t>6/11/2021</a:t>
+              <a:t>10/25/2021</a:t>
             </a:fld>
             <a:endParaRPr lang="en-US" dirty="0"/>
           </a:p>
@@ -24524,7 +24660,7 @@
           <a:p>
             <a:fld id="{42A54C80-263E-416B-A8E0-580EDEADCBDC}" type="datetimeFigureOut">
               <a:rPr lang="en-US" smtClean="0"/>
-              <a:t>6/11/2021</a:t>
+              <a:t>10/25/2021</a:t>
             </a:fld>
             <a:endParaRPr lang="en-US" dirty="0"/>
           </a:p>
@@ -24819,7 +24955,7 @@
             <a:fld id="{B61BEF0D-F0BB-DE4B-95CE-6DB70DBA9567}" type="datetimeFigureOut">
               <a:rPr lang="en-US" smtClean="0"/>
               <a:pPr/>
-              <a:t>6/11/2021</a:t>
+              <a:t>10/25/2021</a:t>
             </a:fld>
             <a:endParaRPr lang="en-US" dirty="0"/>
           </a:p>
@@ -25084,7 +25220,7 @@
             <a:fld id="{B61BEF0D-F0BB-DE4B-95CE-6DB70DBA9567}" type="datetimeFigureOut">
               <a:rPr lang="en-US" smtClean="0"/>
               <a:pPr/>
-              <a:t>6/11/2021</a:t>
+              <a:t>10/25/2021</a:t>
             </a:fld>
             <a:endParaRPr lang="en-US" dirty="0"/>
           </a:p>
@@ -30369,61 +30505,61 @@
               <a:buNone/>
             </a:pPr>
             <a:r>
-              <a:rPr lang="en-US" sz="1100" dirty="0">
+              <a:rPr lang="en-US" sz="1200" dirty="0">
                 <a:latin typeface="Courier New" panose="02070309020205020404" pitchFamily="49" charset="0"/>
                 <a:cs typeface="Courier New" panose="02070309020205020404" pitchFamily="49" charset="0"/>
               </a:rPr>
               <a:t>[build-system]</a:t>
             </a:r>
             <a:br>
-              <a:rPr lang="en-US" sz="1100" dirty="0">
+              <a:rPr lang="en-US" sz="1200" dirty="0">
                 <a:latin typeface="Courier New" panose="02070309020205020404" pitchFamily="49" charset="0"/>
                 <a:cs typeface="Courier New" panose="02070309020205020404" pitchFamily="49" charset="0"/>
               </a:rPr>
             </a:br>
             <a:r>
-              <a:rPr lang="en-US" sz="1100" dirty="0">
+              <a:rPr lang="en-US" sz="1200" dirty="0">
                 <a:latin typeface="Courier New" panose="02070309020205020404" pitchFamily="49" charset="0"/>
                 <a:cs typeface="Courier New" panose="02070309020205020404" pitchFamily="49" charset="0"/>
               </a:rPr>
               <a:t>requires = ["</a:t>
             </a:r>
             <a:r>
-              <a:rPr lang="en-US" sz="1100" dirty="0" err="1">
+              <a:rPr lang="en-US" sz="1200" dirty="0" err="1">
                 <a:latin typeface="Courier New" panose="02070309020205020404" pitchFamily="49" charset="0"/>
                 <a:cs typeface="Courier New" panose="02070309020205020404" pitchFamily="49" charset="0"/>
               </a:rPr>
               <a:t>setuptools</a:t>
             </a:r>
             <a:r>
-              <a:rPr lang="en-US" sz="1100" dirty="0">
+              <a:rPr lang="en-US" sz="1200" dirty="0">
                 <a:latin typeface="Courier New" panose="02070309020205020404" pitchFamily="49" charset="0"/>
                 <a:cs typeface="Courier New" panose="02070309020205020404" pitchFamily="49" charset="0"/>
               </a:rPr>
               <a:t>&gt;=42", "wheel"]</a:t>
             </a:r>
             <a:br>
-              <a:rPr lang="en-US" sz="1100" dirty="0">
+              <a:rPr lang="en-US" sz="1200" dirty="0">
                 <a:latin typeface="Courier New" panose="02070309020205020404" pitchFamily="49" charset="0"/>
                 <a:cs typeface="Courier New" panose="02070309020205020404" pitchFamily="49" charset="0"/>
               </a:rPr>
             </a:br>
             <a:r>
-              <a:rPr lang="en-US" sz="1100" dirty="0">
+              <a:rPr lang="en-US" sz="1200" dirty="0">
                 <a:latin typeface="Courier New" panose="02070309020205020404" pitchFamily="49" charset="0"/>
                 <a:cs typeface="Courier New" panose="02070309020205020404" pitchFamily="49" charset="0"/>
               </a:rPr>
               <a:t>build-backend = "</a:t>
             </a:r>
             <a:r>
-              <a:rPr lang="en-US" sz="1100" dirty="0" err="1">
+              <a:rPr lang="en-US" sz="1200" dirty="0" err="1">
                 <a:latin typeface="Courier New" panose="02070309020205020404" pitchFamily="49" charset="0"/>
                 <a:cs typeface="Courier New" panose="02070309020205020404" pitchFamily="49" charset="0"/>
               </a:rPr>
               <a:t>setuptools.build_meta</a:t>
             </a:r>
             <a:r>
-              <a:rPr lang="en-US" sz="1100" dirty="0">
+              <a:rPr lang="en-US" sz="1200" dirty="0">
                 <a:latin typeface="Courier New" panose="02070309020205020404" pitchFamily="49" charset="0"/>
                 <a:cs typeface="Courier New" panose="02070309020205020404" pitchFamily="49" charset="0"/>
               </a:rPr>
@@ -30446,7 +30582,7 @@
               <a:buChar char="•"/>
             </a:pPr>
             <a:r>
-              <a:rPr lang="en-US" sz="1500" dirty="0"/>
+              <a:rPr lang="en-US" sz="1800" dirty="0"/>
               <a:t>poetry</a:t>
             </a:r>
           </a:p>
@@ -30456,7 +30592,7 @@
               <a:buChar char="•"/>
             </a:pPr>
             <a:r>
-              <a:rPr lang="en-US" sz="1500" dirty="0"/>
+              <a:rPr lang="en-US" sz="1800" dirty="0"/>
               <a:t>flit</a:t>
             </a:r>
           </a:p>
@@ -31210,7 +31346,7 @@
           <a:p>
             <a:r>
               <a:rPr lang="en-US" sz="1100" b="1" dirty="0"/>
-              <a:t>$ python -m build</a:t>
+              <a:t>$ python -m build &amp;&amp; twine upload</a:t>
             </a:r>
             <a:endParaRPr lang="en-IE" sz="1100" b="1" dirty="0"/>
           </a:p>
@@ -31260,6 +31396,10 @@
           </p:nvPr>
         </p:nvSpPr>
         <p:spPr>
+          <a:xfrm>
+            <a:off x="909950" y="1485899"/>
+            <a:ext cx="7216800" cy="3472355"/>
+          </a:xfrm>
           <a:prstGeom prst="rect">
             <a:avLst/>
           </a:prstGeom>
@@ -31294,16 +31434,16 @@
               <a:t>Tox </a:t>
             </a:r>
             <a:r>
-              <a:rPr lang="en-IE" b="1" dirty="0" err="1"/>
+              <a:rPr lang="en-IE" sz="1800" dirty="0"/>
+              <a:t>will use it with </a:t>
+            </a:r>
+            <a:r>
+              <a:rPr lang="en-IE" sz="1800" b="1" dirty="0" err="1"/>
               <a:t>isolated_build</a:t>
             </a:r>
             <a:r>
-              <a:rPr lang="en-IE" b="1" dirty="0"/>
-              <a:t>=true </a:t>
-            </a:r>
-            <a:r>
-              <a:rPr lang="en-IE" dirty="0"/>
-              <a:t>will use it</a:t>
+              <a:rPr lang="en-IE" sz="1800" b="1" dirty="0"/>
+              <a:t>=true</a:t>
             </a:r>
             <a:endParaRPr lang="en-US" sz="1800" dirty="0"/>
           </a:p>
@@ -31392,6 +31532,32 @@
                 <a:sym typeface="Wingdings" panose="05000000000000000000" pitchFamily="2" charset="2"/>
               </a:rPr>
               <a:t> as config file</a:t>
+            </a:r>
+          </a:p>
+          <a:p>
+            <a:pPr marL="387350" indent="-285750">
+              <a:buFont typeface="Arial" panose="020B0604020202020204" pitchFamily="34" charset="0"/>
+              <a:buChar char="•"/>
+            </a:pPr>
+            <a:r>
+              <a:rPr lang="en-US" sz="1800" dirty="0"/>
+              <a:t>What about lock files to manage transient dependencies?</a:t>
+            </a:r>
+          </a:p>
+          <a:p>
+            <a:pPr marL="844550" lvl="1" indent="-285750">
+              <a:buFont typeface="Arial" panose="020B0604020202020204" pitchFamily="34" charset="0"/>
+              <a:buChar char="•"/>
+            </a:pPr>
+            <a:r>
+              <a:rPr lang="en-US" sz="1200" dirty="0"/>
+              <a:t>Probably in 2022 with </a:t>
+            </a:r>
+            <a:r>
+              <a:rPr lang="en-US" sz="1200" dirty="0">
+                <a:hlinkClick r:id="rId4"/>
+              </a:rPr>
+              <a:t>PEP 665 -- Specifying Installation Requirements for Python Projects</a:t>
             </a:r>
             <a:endParaRPr lang="en-US" sz="1200" dirty="0"/>
           </a:p>
@@ -31549,7 +31715,7 @@
           <p:nvPr/>
         </p:nvPicPr>
         <p:blipFill>
-          <a:blip r:embed="rId4">
+          <a:blip r:embed="rId5">
             <a:alphaModFix/>
           </a:blip>
           <a:stretch>
@@ -31583,7 +31749,7 @@
           <p:nvPr/>
         </p:nvPicPr>
         <p:blipFill>
-          <a:blip r:embed="rId5">
+          <a:blip r:embed="rId6">
             <a:alphaModFix/>
           </a:blip>
           <a:stretch>
@@ -31617,7 +31783,7 @@
           <p:nvPr/>
         </p:nvPicPr>
         <p:blipFill>
-          <a:blip r:embed="rId6">
+          <a:blip r:embed="rId7">
             <a:alphaModFix/>
           </a:blip>
           <a:stretch>
@@ -31651,7 +31817,7 @@
           <p:nvPr/>
         </p:nvPicPr>
         <p:blipFill>
-          <a:blip r:embed="rId7">
+          <a:blip r:embed="rId8">
             <a:alphaModFix/>
           </a:blip>
           <a:stretch>
@@ -31947,7 +32113,7 @@
             </a:r>
             <a:r>
               <a:rPr lang="en-US" sz="1600" dirty="0"/>
-              <a:t>, and keep an empty setup.py for compatibility(*)</a:t>
+              <a:t>, and keep an empty setup.py for compatibility</a:t>
             </a:r>
           </a:p>
           <a:p>
@@ -31957,12 +32123,30 @@
             </a:pPr>
             <a:r>
               <a:rPr lang="en-US" sz="1600" dirty="0"/>
+              <a:t>Direct setup.py invocation are deprecated: use </a:t>
+            </a:r>
+            <a:r>
+              <a:rPr lang="en-US" sz="1600" i="1" dirty="0"/>
+              <a:t>python –m build </a:t>
+            </a:r>
+            <a:r>
+              <a:rPr lang="en-US" sz="1600" dirty="0"/>
+              <a:t>and </a:t>
+            </a:r>
+            <a:r>
+              <a:rPr lang="en-US" sz="1600" i="1" dirty="0"/>
+              <a:t>twine upload</a:t>
+            </a:r>
+          </a:p>
+          <a:p>
+            <a:pPr marL="387350" lvl="0" indent="-285750">
+              <a:buFont typeface="Arial" panose="020B0604020202020204" pitchFamily="34" charset="0"/>
+              <a:buChar char="•"/>
+            </a:pPr>
+            <a:r>
+              <a:rPr lang="en-US" sz="1600" strike="sngStrike" dirty="0"/>
               <a:t>Don’t use Alpine Linux for containers (yet)</a:t>
             </a:r>
-            <a:endParaRPr lang="en-US" dirty="0">
-              <a:latin typeface="Courier New" panose="02070309020205020404" pitchFamily="49" charset="0"/>
-              <a:cs typeface="Courier New" panose="02070309020205020404" pitchFamily="49" charset="0"/>
-            </a:endParaRPr>
           </a:p>
           <a:p>
             <a:pPr marL="1473200" lvl="3" indent="0">
@@ -31990,14 +32174,6 @@
               <a:latin typeface="Courier New" panose="02070309020205020404" pitchFamily="49" charset="0"/>
               <a:cs typeface="Courier New" panose="02070309020205020404" pitchFamily="49" charset="0"/>
             </a:endParaRPr>
-          </a:p>
-          <a:p>
-            <a:pPr marL="101600" lvl="0" indent="0"/>
-            <a:r>
-              <a:rPr lang="en-US" sz="1600" dirty="0"/>
-              <a:t>(*) Also, for editable installations which are being worked on (pip install -e)</a:t>
-            </a:r>
-            <a:endParaRPr sz="1600" dirty="0"/>
           </a:p>
         </p:txBody>
       </p:sp>
@@ -33470,6 +33646,332 @@
   <p:cSld>
     <p:spTree>
       <p:nvGrpSpPr>
+        <p:cNvPr id="1" name="Shape 121"/>
+        <p:cNvGrpSpPr/>
+        <p:nvPr/>
+      </p:nvGrpSpPr>
+      <p:grpSpPr>
+        <a:xfrm>
+          <a:off x="0" y="0"/>
+          <a:ext cx="0" cy="0"/>
+          <a:chOff x="0" y="0"/>
+          <a:chExt cx="0" cy="0"/>
+        </a:xfrm>
+      </p:grpSpPr>
+      <p:sp>
+        <p:nvSpPr>
+          <p:cNvPr id="123" name="Google Shape;123;p16"/>
+          <p:cNvSpPr txBox="1">
+            <a:spLocks noGrp="1"/>
+          </p:cNvSpPr>
+          <p:nvPr>
+            <p:ph type="title"/>
+          </p:nvPr>
+        </p:nvSpPr>
+        <p:spPr>
+          <a:prstGeom prst="rect">
+            <a:avLst/>
+          </a:prstGeom>
+        </p:spPr>
+        <p:txBody>
+          <a:bodyPr spcFirstLastPara="1" wrap="square" lIns="0" tIns="0" rIns="0" bIns="0" anchor="ctr" anchorCtr="0">
+            <a:noAutofit/>
+          </a:bodyPr>
+          <a:lstStyle/>
+          <a:p>
+            <a:pPr lvl="0"/>
+            <a:r>
+              <a:rPr lang="en-US" dirty="0"/>
+              <a:t>SETUPTOOLS_SCM</a:t>
+            </a:r>
+            <a:endParaRPr dirty="0"/>
+          </a:p>
+        </p:txBody>
+      </p:sp>
+      <p:sp>
+        <p:nvSpPr>
+          <p:cNvPr id="124" name="Google Shape;124;p16"/>
+          <p:cNvSpPr txBox="1">
+            <a:spLocks noGrp="1"/>
+          </p:cNvSpPr>
+          <p:nvPr>
+            <p:ph type="sldNum" idx="12"/>
+          </p:nvPr>
+        </p:nvSpPr>
+        <p:spPr>
+          <a:prstGeom prst="rect">
+            <a:avLst/>
+          </a:prstGeom>
+        </p:spPr>
+        <p:txBody>
+          <a:bodyPr spcFirstLastPara="1" wrap="square" lIns="0" tIns="0" rIns="0" bIns="0" anchor="ctr" anchorCtr="0">
+            <a:noAutofit/>
+          </a:bodyPr>
+          <a:lstStyle/>
+          <a:p>
+            <a:pPr marL="0" lvl="0" indent="0" algn="ctr" rtl="0">
+              <a:spcBef>
+                <a:spcPts val="0"/>
+              </a:spcBef>
+              <a:spcAft>
+                <a:spcPts val="0"/>
+              </a:spcAft>
+              <a:buClr>
+                <a:srgbClr val="FFFFFF"/>
+              </a:buClr>
+              <a:buSzPts val="800"/>
+              <a:buFont typeface="Arial"/>
+              <a:buNone/>
+            </a:pPr>
+            <a:fld id="{00000000-1234-1234-1234-123412341234}" type="slidenum">
+              <a:rPr lang="en-US"/>
+              <a:t>24</a:t>
+            </a:fld>
+            <a:endParaRPr/>
+          </a:p>
+        </p:txBody>
+      </p:sp>
+      <p:sp>
+        <p:nvSpPr>
+          <p:cNvPr id="125" name="Google Shape;125;p16"/>
+          <p:cNvSpPr/>
+          <p:nvPr/>
+        </p:nvSpPr>
+        <p:spPr>
+          <a:xfrm>
+            <a:off x="687800" y="84625"/>
+            <a:ext cx="1305900" cy="528300"/>
+          </a:xfrm>
+          <a:prstGeom prst="rect">
+            <a:avLst/>
+          </a:prstGeom>
+          <a:solidFill>
+            <a:srgbClr val="FFFFFF"/>
+          </a:solidFill>
+          <a:ln>
+            <a:noFill/>
+          </a:ln>
+        </p:spPr>
+        <p:txBody>
+          <a:bodyPr spcFirstLastPara="1" wrap="square" lIns="91425" tIns="91425" rIns="91425" bIns="91425" anchor="ctr" anchorCtr="0">
+            <a:noAutofit/>
+          </a:bodyPr>
+          <a:lstStyle/>
+          <a:p>
+            <a:pPr marL="0" lvl="0" indent="0" algn="l" rtl="0">
+              <a:spcBef>
+                <a:spcPts val="0"/>
+              </a:spcBef>
+              <a:spcAft>
+                <a:spcPts val="0"/>
+              </a:spcAft>
+              <a:buNone/>
+            </a:pPr>
+            <a:endParaRPr/>
+          </a:p>
+        </p:txBody>
+      </p:sp>
+      <p:pic>
+        <p:nvPicPr>
+          <p:cNvPr id="6" name="Picture 5">
+            <a:extLst>
+              <a:ext uri="{FF2B5EF4-FFF2-40B4-BE49-F238E27FC236}">
+                <a16:creationId xmlns:a16="http://schemas.microsoft.com/office/drawing/2014/main" id="{F3F6B1AE-4146-4DB7-A773-3E253C843BB0}"/>
+              </a:ext>
+            </a:extLst>
+          </p:cNvPr>
+          <p:cNvPicPr>
+            <a:picLocks noChangeAspect="1"/>
+          </p:cNvPicPr>
+          <p:nvPr/>
+        </p:nvPicPr>
+        <p:blipFill>
+          <a:blip r:embed="rId3"/>
+          <a:stretch>
+            <a:fillRect/>
+          </a:stretch>
+        </p:blipFill>
+        <p:spPr>
+          <a:xfrm>
+            <a:off x="954750" y="1406325"/>
+            <a:ext cx="7234500" cy="3460457"/>
+          </a:xfrm>
+          <a:prstGeom prst="rect">
+            <a:avLst/>
+          </a:prstGeom>
+        </p:spPr>
+      </p:pic>
+      <p:cxnSp>
+        <p:nvCxnSpPr>
+          <p:cNvPr id="7" name="Straight Arrow Connector 6">
+            <a:extLst>
+              <a:ext uri="{FF2B5EF4-FFF2-40B4-BE49-F238E27FC236}">
+                <a16:creationId xmlns:a16="http://schemas.microsoft.com/office/drawing/2014/main" id="{68C98211-75C9-4E6F-8B85-D88F770E2DDB}"/>
+              </a:ext>
+            </a:extLst>
+          </p:cNvPr>
+          <p:cNvCxnSpPr>
+            <a:cxnSpLocks/>
+          </p:cNvCxnSpPr>
+          <p:nvPr/>
+        </p:nvCxnSpPr>
+        <p:spPr>
+          <a:xfrm>
+            <a:off x="3791607" y="3011213"/>
+            <a:ext cx="0" cy="599090"/>
+          </a:xfrm>
+          <a:prstGeom prst="straightConnector1">
+            <a:avLst/>
+          </a:prstGeom>
+          <a:ln>
+            <a:solidFill>
+              <a:srgbClr val="FF0000"/>
+            </a:solidFill>
+            <a:tailEnd type="triangle"/>
+          </a:ln>
+        </p:spPr>
+        <p:style>
+          <a:lnRef idx="1">
+            <a:schemeClr val="accent1"/>
+          </a:lnRef>
+          <a:fillRef idx="0">
+            <a:schemeClr val="accent1"/>
+          </a:fillRef>
+          <a:effectRef idx="0">
+            <a:schemeClr val="accent1"/>
+          </a:effectRef>
+          <a:fontRef idx="minor">
+            <a:schemeClr val="tx1"/>
+          </a:fontRef>
+        </p:style>
+      </p:cxnSp>
+      <p:sp>
+        <p:nvSpPr>
+          <p:cNvPr id="15" name="Rectangle 14">
+            <a:extLst>
+              <a:ext uri="{FF2B5EF4-FFF2-40B4-BE49-F238E27FC236}">
+                <a16:creationId xmlns:a16="http://schemas.microsoft.com/office/drawing/2014/main" id="{6FED5F69-714D-4C92-A22D-AE1E1581DE50}"/>
+              </a:ext>
+            </a:extLst>
+          </p:cNvPr>
+          <p:cNvSpPr/>
+          <p:nvPr/>
+        </p:nvSpPr>
+        <p:spPr>
+          <a:xfrm>
+            <a:off x="3694788" y="3656955"/>
+            <a:ext cx="6231828" cy="369332"/>
+          </a:xfrm>
+          <a:prstGeom prst="rect">
+            <a:avLst/>
+          </a:prstGeom>
+        </p:spPr>
+        <p:txBody>
+          <a:bodyPr wrap="square">
+            <a:spAutoFit/>
+          </a:bodyPr>
+          <a:lstStyle/>
+          <a:p>
+            <a:pPr marL="171450" indent="-171450">
+              <a:buFont typeface="Arial" panose="020B0604020202020204" pitchFamily="34" charset="0"/>
+              <a:buChar char="•"/>
+            </a:pPr>
+            <a:r>
+              <a:rPr lang="en-IE" sz="900" dirty="0">
+                <a:latin typeface="Courier New" panose="02070309020205020404" pitchFamily="49" charset="0"/>
+                <a:cs typeface="Courier New" panose="02070309020205020404" pitchFamily="49" charset="0"/>
+              </a:rPr>
+              <a:t>Writes toto/_version.py based on tag name</a:t>
+            </a:r>
+          </a:p>
+          <a:p>
+            <a:pPr marL="171450" indent="-171450">
+              <a:buFont typeface="Arial" panose="020B0604020202020204" pitchFamily="34" charset="0"/>
+              <a:buChar char="•"/>
+            </a:pPr>
+            <a:r>
+              <a:rPr lang="en-IE" sz="900" dirty="0">
+                <a:latin typeface="Courier New" panose="02070309020205020404" pitchFamily="49" charset="0"/>
+                <a:cs typeface="Courier New" panose="02070309020205020404" pitchFamily="49" charset="0"/>
+              </a:rPr>
+              <a:t>Writes version in METADATA/PKG-INFO in </a:t>
+            </a:r>
+            <a:r>
+              <a:rPr lang="en-IE" sz="900" dirty="0" err="1">
+                <a:latin typeface="Courier New" panose="02070309020205020404" pitchFamily="49" charset="0"/>
+                <a:cs typeface="Courier New" panose="02070309020205020404" pitchFamily="49" charset="0"/>
+              </a:rPr>
+              <a:t>sdist</a:t>
+            </a:r>
+            <a:r>
+              <a:rPr lang="en-IE" sz="900" dirty="0">
+                <a:latin typeface="Courier New" panose="02070309020205020404" pitchFamily="49" charset="0"/>
+                <a:cs typeface="Courier New" panose="02070309020205020404" pitchFamily="49" charset="0"/>
+              </a:rPr>
+              <a:t>/wheel</a:t>
+            </a:r>
+          </a:p>
+        </p:txBody>
+      </p:sp>
+      <p:cxnSp>
+        <p:nvCxnSpPr>
+          <p:cNvPr id="16" name="Straight Arrow Connector 15">
+            <a:extLst>
+              <a:ext uri="{FF2B5EF4-FFF2-40B4-BE49-F238E27FC236}">
+                <a16:creationId xmlns:a16="http://schemas.microsoft.com/office/drawing/2014/main" id="{E644B2F4-C586-4F06-A73F-0D76A564DC7E}"/>
+              </a:ext>
+            </a:extLst>
+          </p:cNvPr>
+          <p:cNvCxnSpPr>
+            <a:cxnSpLocks/>
+          </p:cNvCxnSpPr>
+          <p:nvPr/>
+        </p:nvCxnSpPr>
+        <p:spPr>
+          <a:xfrm flipH="1" flipV="1">
+            <a:off x="2719552" y="1836684"/>
+            <a:ext cx="3594538" cy="1846469"/>
+          </a:xfrm>
+          <a:prstGeom prst="straightConnector1">
+            <a:avLst/>
+          </a:prstGeom>
+          <a:ln>
+            <a:tailEnd type="triangle"/>
+          </a:ln>
+        </p:spPr>
+        <p:style>
+          <a:lnRef idx="1">
+            <a:schemeClr val="accent1"/>
+          </a:lnRef>
+          <a:fillRef idx="0">
+            <a:schemeClr val="accent1"/>
+          </a:fillRef>
+          <a:effectRef idx="0">
+            <a:schemeClr val="accent1"/>
+          </a:effectRef>
+          <a:fontRef idx="minor">
+            <a:schemeClr val="tx1"/>
+          </a:fontRef>
+        </p:style>
+      </p:cxnSp>
+    </p:spTree>
+    <p:extLst>
+      <p:ext uri="{BB962C8B-B14F-4D97-AF65-F5344CB8AC3E}">
+        <p14:creationId xmlns:p14="http://schemas.microsoft.com/office/powerpoint/2010/main" val="2547755721"/>
+      </p:ext>
+    </p:extLst>
+  </p:cSld>
+  <p:clrMapOvr>
+    <a:masterClrMapping/>
+  </p:clrMapOvr>
+</p:sld>
+</file>
+
+<file path=ppt/slides/slide25.xml><?xml version="1.0" encoding="utf-8"?>
+<p:sld xmlns:a="http://schemas.openxmlformats.org/drawingml/2006/main" xmlns:r="http://schemas.openxmlformats.org/officeDocument/2006/relationships" xmlns:p="http://schemas.openxmlformats.org/presentationml/2006/main">
+  <p:cSld>
+    <p:spTree>
+      <p:nvGrpSpPr>
         <p:cNvPr id="1" name="Shape 209"/>
         <p:cNvGrpSpPr/>
         <p:nvPr/>
@@ -33561,7 +34063,7 @@
             </a:pPr>
             <a:fld id="{00000000-1234-1234-1234-123412341234}" type="slidenum">
               <a:rPr lang="en-US"/>
-              <a:t>24</a:t>
+              <a:t>25</a:t>
             </a:fld>
             <a:endParaRPr/>
           </a:p>
@@ -33611,209 +34113,6 @@
     <p:extLst>
       <p:ext uri="{BB962C8B-B14F-4D97-AF65-F5344CB8AC3E}">
         <p14:creationId xmlns:p14="http://schemas.microsoft.com/office/powerpoint/2010/main" val="504576574"/>
-      </p:ext>
-    </p:extLst>
-  </p:cSld>
-  <p:clrMapOvr>
-    <a:masterClrMapping/>
-  </p:clrMapOvr>
-</p:sld>
-</file>
-
-<file path=ppt/slides/slide25.xml><?xml version="1.0" encoding="utf-8"?>
-<p:sld xmlns:a="http://schemas.openxmlformats.org/drawingml/2006/main" xmlns:r="http://schemas.openxmlformats.org/officeDocument/2006/relationships" xmlns:p="http://schemas.openxmlformats.org/presentationml/2006/main">
-  <p:cSld>
-    <p:spTree>
-      <p:nvGrpSpPr>
-        <p:cNvPr id="1" name="Shape 121"/>
-        <p:cNvGrpSpPr/>
-        <p:nvPr/>
-      </p:nvGrpSpPr>
-      <p:grpSpPr>
-        <a:xfrm>
-          <a:off x="0" y="0"/>
-          <a:ext cx="0" cy="0"/>
-          <a:chOff x="0" y="0"/>
-          <a:chExt cx="0" cy="0"/>
-        </a:xfrm>
-      </p:grpSpPr>
-      <p:sp>
-        <p:nvSpPr>
-          <p:cNvPr id="123" name="Google Shape;123;p16"/>
-          <p:cNvSpPr txBox="1">
-            <a:spLocks noGrp="1"/>
-          </p:cNvSpPr>
-          <p:nvPr>
-            <p:ph type="title"/>
-          </p:nvPr>
-        </p:nvSpPr>
-        <p:spPr>
-          <a:prstGeom prst="rect">
-            <a:avLst/>
-          </a:prstGeom>
-        </p:spPr>
-        <p:txBody>
-          <a:bodyPr spcFirstLastPara="1" wrap="square" lIns="0" tIns="0" rIns="0" bIns="0" anchor="ctr" anchorCtr="0">
-            <a:noAutofit/>
-          </a:bodyPr>
-          <a:lstStyle/>
-          <a:p>
-            <a:pPr lvl="0"/>
-            <a:r>
-              <a:rPr lang="en-US" dirty="0" err="1"/>
-              <a:t>Conda</a:t>
-            </a:r>
-            <a:endParaRPr dirty="0"/>
-          </a:p>
-        </p:txBody>
-      </p:sp>
-      <p:sp>
-        <p:nvSpPr>
-          <p:cNvPr id="124" name="Google Shape;124;p16"/>
-          <p:cNvSpPr txBox="1">
-            <a:spLocks noGrp="1"/>
-          </p:cNvSpPr>
-          <p:nvPr>
-            <p:ph type="sldNum" idx="12"/>
-          </p:nvPr>
-        </p:nvSpPr>
-        <p:spPr>
-          <a:prstGeom prst="rect">
-            <a:avLst/>
-          </a:prstGeom>
-        </p:spPr>
-        <p:txBody>
-          <a:bodyPr spcFirstLastPara="1" wrap="square" lIns="0" tIns="0" rIns="0" bIns="0" anchor="ctr" anchorCtr="0">
-            <a:noAutofit/>
-          </a:bodyPr>
-          <a:lstStyle/>
-          <a:p>
-            <a:pPr marL="0" lvl="0" indent="0" algn="ctr" rtl="0">
-              <a:spcBef>
-                <a:spcPts val="0"/>
-              </a:spcBef>
-              <a:spcAft>
-                <a:spcPts val="0"/>
-              </a:spcAft>
-              <a:buClr>
-                <a:srgbClr val="FFFFFF"/>
-              </a:buClr>
-              <a:buSzPts val="800"/>
-              <a:buFont typeface="Arial"/>
-              <a:buNone/>
-            </a:pPr>
-            <a:fld id="{00000000-1234-1234-1234-123412341234}" type="slidenum">
-              <a:rPr lang="en-US"/>
-              <a:t>25</a:t>
-            </a:fld>
-            <a:endParaRPr/>
-          </a:p>
-        </p:txBody>
-      </p:sp>
-      <p:sp>
-        <p:nvSpPr>
-          <p:cNvPr id="125" name="Google Shape;125;p16"/>
-          <p:cNvSpPr/>
-          <p:nvPr/>
-        </p:nvSpPr>
-        <p:spPr>
-          <a:xfrm>
-            <a:off x="687800" y="84625"/>
-            <a:ext cx="1305900" cy="528300"/>
-          </a:xfrm>
-          <a:prstGeom prst="rect">
-            <a:avLst/>
-          </a:prstGeom>
-          <a:solidFill>
-            <a:srgbClr val="FFFFFF"/>
-          </a:solidFill>
-          <a:ln>
-            <a:noFill/>
-          </a:ln>
-        </p:spPr>
-        <p:txBody>
-          <a:bodyPr spcFirstLastPara="1" wrap="square" lIns="91425" tIns="91425" rIns="91425" bIns="91425" anchor="ctr" anchorCtr="0">
-            <a:noAutofit/>
-          </a:bodyPr>
-          <a:lstStyle/>
-          <a:p>
-            <a:pPr marL="0" lvl="0" indent="0" algn="l" rtl="0">
-              <a:spcBef>
-                <a:spcPts val="0"/>
-              </a:spcBef>
-              <a:spcAft>
-                <a:spcPts val="0"/>
-              </a:spcAft>
-              <a:buNone/>
-            </a:pPr>
-            <a:endParaRPr/>
-          </a:p>
-        </p:txBody>
-      </p:sp>
-      <p:sp>
-        <p:nvSpPr>
-          <p:cNvPr id="3" name="Rectangle 2">
-            <a:extLst>
-              <a:ext uri="{FF2B5EF4-FFF2-40B4-BE49-F238E27FC236}">
-                <a16:creationId xmlns:a16="http://schemas.microsoft.com/office/drawing/2014/main" id="{161D4F6F-D46F-4141-8952-AEFABB9EDDF3}"/>
-              </a:ext>
-            </a:extLst>
-          </p:cNvPr>
-          <p:cNvSpPr/>
-          <p:nvPr/>
-        </p:nvSpPr>
-        <p:spPr>
-          <a:xfrm>
-            <a:off x="687800" y="1641613"/>
-            <a:ext cx="4572000" cy="923330"/>
-          </a:xfrm>
-          <a:prstGeom prst="rect">
-            <a:avLst/>
-          </a:prstGeom>
-        </p:spPr>
-        <p:txBody>
-          <a:bodyPr>
-            <a:spAutoFit/>
-          </a:bodyPr>
-          <a:lstStyle/>
-          <a:p>
-            <a:pPr marL="387350" indent="-285750">
-              <a:buFont typeface="Arial" panose="020B0604020202020204" pitchFamily="34" charset="0"/>
-              <a:buChar char="•"/>
-            </a:pPr>
-            <a:r>
-              <a:rPr lang="en-US" dirty="0"/>
-              <a:t>Another packaging system</a:t>
-            </a:r>
-          </a:p>
-          <a:p>
-            <a:pPr marL="387350" indent="-285750">
-              <a:buFont typeface="Arial" panose="020B0604020202020204" pitchFamily="34" charset="0"/>
-              <a:buChar char="•"/>
-            </a:pPr>
-            <a:r>
-              <a:rPr lang="en-US" dirty="0"/>
-              <a:t>Completely separated from </a:t>
-            </a:r>
-            <a:r>
-              <a:rPr lang="en-US" dirty="0" err="1"/>
-              <a:t>PyPI</a:t>
-            </a:r>
-            <a:endParaRPr lang="en-US" dirty="0"/>
-          </a:p>
-          <a:p>
-            <a:pPr marL="387350" indent="-285750">
-              <a:buFont typeface="Arial" panose="020B0604020202020204" pitchFamily="34" charset="0"/>
-              <a:buChar char="•"/>
-            </a:pPr>
-            <a:endParaRPr lang="en-US" dirty="0"/>
-          </a:p>
-        </p:txBody>
-      </p:sp>
-    </p:spTree>
-    <p:extLst>
-      <p:ext uri="{BB962C8B-B14F-4D97-AF65-F5344CB8AC3E}">
-        <p14:creationId xmlns:p14="http://schemas.microsoft.com/office/powerpoint/2010/main" val="1006548100"/>
       </p:ext>
     </p:extLst>
   </p:cSld>
@@ -33864,7 +34163,7 @@
             <a:pPr lvl="0"/>
             <a:r>
               <a:rPr lang="en-US" dirty="0" err="1"/>
-              <a:t>pipx</a:t>
+              <a:t>Conda</a:t>
             </a:r>
             <a:endParaRPr dirty="0"/>
           </a:p>
@@ -33968,6 +34267,243 @@
         <p:spPr>
           <a:xfrm>
             <a:off x="687799" y="1641613"/>
+            <a:ext cx="8218002" cy="1754326"/>
+          </a:xfrm>
+          <a:prstGeom prst="rect">
+            <a:avLst/>
+          </a:prstGeom>
+        </p:spPr>
+        <p:txBody>
+          <a:bodyPr wrap="square">
+            <a:spAutoFit/>
+          </a:bodyPr>
+          <a:lstStyle/>
+          <a:p>
+            <a:pPr marL="387350" indent="-285750">
+              <a:buFont typeface="Arial" panose="020B0604020202020204" pitchFamily="34" charset="0"/>
+              <a:buChar char="•"/>
+            </a:pPr>
+            <a:r>
+              <a:rPr lang="en-US" dirty="0"/>
+              <a:t>Another packaging system</a:t>
+            </a:r>
+          </a:p>
+          <a:p>
+            <a:pPr marL="387350" indent="-285750">
+              <a:buFont typeface="Arial" panose="020B0604020202020204" pitchFamily="34" charset="0"/>
+              <a:buChar char="•"/>
+            </a:pPr>
+            <a:r>
+              <a:rPr lang="en-US" dirty="0"/>
+              <a:t>Completely separated from </a:t>
+            </a:r>
+            <a:r>
+              <a:rPr lang="en-US" dirty="0" err="1"/>
+              <a:t>PyPI</a:t>
+            </a:r>
+            <a:endParaRPr lang="en-US" dirty="0"/>
+          </a:p>
+          <a:p>
+            <a:pPr marL="387350" indent="-285750">
+              <a:buFont typeface="Arial" panose="020B0604020202020204" pitchFamily="34" charset="0"/>
+              <a:buChar char="•"/>
+            </a:pPr>
+            <a:endParaRPr lang="en-US" dirty="0"/>
+          </a:p>
+          <a:p>
+            <a:pPr marL="387350" indent="-285750">
+              <a:buFont typeface="Arial" panose="020B0604020202020204" pitchFamily="34" charset="0"/>
+              <a:buChar char="•"/>
+            </a:pPr>
+            <a:r>
+              <a:rPr lang="en-US" dirty="0"/>
+              <a:t>Key difference:</a:t>
+            </a:r>
+          </a:p>
+          <a:p>
+            <a:pPr marL="844550" lvl="1" indent="-285750">
+              <a:buFont typeface="Arial" panose="020B0604020202020204" pitchFamily="34" charset="0"/>
+              <a:buChar char="•"/>
+            </a:pPr>
+            <a:r>
+              <a:rPr lang="en-US" dirty="0"/>
+              <a:t>pip installs Python packages </a:t>
+            </a:r>
+          </a:p>
+          <a:p>
+            <a:pPr marL="844550" lvl="1" indent="-285750">
+              <a:buFont typeface="Arial" panose="020B0604020202020204" pitchFamily="34" charset="0"/>
+              <a:buChar char="•"/>
+            </a:pPr>
+            <a:r>
+              <a:rPr lang="en-US" dirty="0" err="1"/>
+              <a:t>conda</a:t>
+            </a:r>
+            <a:r>
+              <a:rPr lang="en-US" dirty="0"/>
+              <a:t> installs packages which may contain software written in any language</a:t>
+            </a:r>
+          </a:p>
+        </p:txBody>
+      </p:sp>
+    </p:spTree>
+    <p:extLst>
+      <p:ext uri="{BB962C8B-B14F-4D97-AF65-F5344CB8AC3E}">
+        <p14:creationId xmlns:p14="http://schemas.microsoft.com/office/powerpoint/2010/main" val="1006548100"/>
+      </p:ext>
+    </p:extLst>
+  </p:cSld>
+  <p:clrMapOvr>
+    <a:masterClrMapping/>
+  </p:clrMapOvr>
+</p:sld>
+</file>
+
+<file path=ppt/slides/slide27.xml><?xml version="1.0" encoding="utf-8"?>
+<p:sld xmlns:a="http://schemas.openxmlformats.org/drawingml/2006/main" xmlns:r="http://schemas.openxmlformats.org/officeDocument/2006/relationships" xmlns:p="http://schemas.openxmlformats.org/presentationml/2006/main">
+  <p:cSld>
+    <p:spTree>
+      <p:nvGrpSpPr>
+        <p:cNvPr id="1" name="Shape 121"/>
+        <p:cNvGrpSpPr/>
+        <p:nvPr/>
+      </p:nvGrpSpPr>
+      <p:grpSpPr>
+        <a:xfrm>
+          <a:off x="0" y="0"/>
+          <a:ext cx="0" cy="0"/>
+          <a:chOff x="0" y="0"/>
+          <a:chExt cx="0" cy="0"/>
+        </a:xfrm>
+      </p:grpSpPr>
+      <p:sp>
+        <p:nvSpPr>
+          <p:cNvPr id="123" name="Google Shape;123;p16"/>
+          <p:cNvSpPr txBox="1">
+            <a:spLocks noGrp="1"/>
+          </p:cNvSpPr>
+          <p:nvPr>
+            <p:ph type="title"/>
+          </p:nvPr>
+        </p:nvSpPr>
+        <p:spPr>
+          <a:prstGeom prst="rect">
+            <a:avLst/>
+          </a:prstGeom>
+        </p:spPr>
+        <p:txBody>
+          <a:bodyPr spcFirstLastPara="1" wrap="square" lIns="0" tIns="0" rIns="0" bIns="0" anchor="ctr" anchorCtr="0">
+            <a:noAutofit/>
+          </a:bodyPr>
+          <a:lstStyle/>
+          <a:p>
+            <a:pPr lvl="0"/>
+            <a:r>
+              <a:rPr lang="en-US" dirty="0" err="1"/>
+              <a:t>pipx</a:t>
+            </a:r>
+            <a:endParaRPr dirty="0"/>
+          </a:p>
+        </p:txBody>
+      </p:sp>
+      <p:sp>
+        <p:nvSpPr>
+          <p:cNvPr id="124" name="Google Shape;124;p16"/>
+          <p:cNvSpPr txBox="1">
+            <a:spLocks noGrp="1"/>
+          </p:cNvSpPr>
+          <p:nvPr>
+            <p:ph type="sldNum" idx="12"/>
+          </p:nvPr>
+        </p:nvSpPr>
+        <p:spPr>
+          <a:prstGeom prst="rect">
+            <a:avLst/>
+          </a:prstGeom>
+        </p:spPr>
+        <p:txBody>
+          <a:bodyPr spcFirstLastPara="1" wrap="square" lIns="0" tIns="0" rIns="0" bIns="0" anchor="ctr" anchorCtr="0">
+            <a:noAutofit/>
+          </a:bodyPr>
+          <a:lstStyle/>
+          <a:p>
+            <a:pPr marL="0" lvl="0" indent="0" algn="ctr" rtl="0">
+              <a:spcBef>
+                <a:spcPts val="0"/>
+              </a:spcBef>
+              <a:spcAft>
+                <a:spcPts val="0"/>
+              </a:spcAft>
+              <a:buClr>
+                <a:srgbClr val="FFFFFF"/>
+              </a:buClr>
+              <a:buSzPts val="800"/>
+              <a:buFont typeface="Arial"/>
+              <a:buNone/>
+            </a:pPr>
+            <a:fld id="{00000000-1234-1234-1234-123412341234}" type="slidenum">
+              <a:rPr lang="en-US"/>
+              <a:t>27</a:t>
+            </a:fld>
+            <a:endParaRPr/>
+          </a:p>
+        </p:txBody>
+      </p:sp>
+      <p:sp>
+        <p:nvSpPr>
+          <p:cNvPr id="125" name="Google Shape;125;p16"/>
+          <p:cNvSpPr/>
+          <p:nvPr/>
+        </p:nvSpPr>
+        <p:spPr>
+          <a:xfrm>
+            <a:off x="687800" y="84625"/>
+            <a:ext cx="1305900" cy="528300"/>
+          </a:xfrm>
+          <a:prstGeom prst="rect">
+            <a:avLst/>
+          </a:prstGeom>
+          <a:solidFill>
+            <a:srgbClr val="FFFFFF"/>
+          </a:solidFill>
+          <a:ln>
+            <a:noFill/>
+          </a:ln>
+        </p:spPr>
+        <p:txBody>
+          <a:bodyPr spcFirstLastPara="1" wrap="square" lIns="91425" tIns="91425" rIns="91425" bIns="91425" anchor="ctr" anchorCtr="0">
+            <a:noAutofit/>
+          </a:bodyPr>
+          <a:lstStyle/>
+          <a:p>
+            <a:pPr marL="0" lvl="0" indent="0" algn="l" rtl="0">
+              <a:spcBef>
+                <a:spcPts val="0"/>
+              </a:spcBef>
+              <a:spcAft>
+                <a:spcPts val="0"/>
+              </a:spcAft>
+              <a:buNone/>
+            </a:pPr>
+            <a:endParaRPr/>
+          </a:p>
+        </p:txBody>
+      </p:sp>
+      <p:sp>
+        <p:nvSpPr>
+          <p:cNvPr id="3" name="Rectangle 2">
+            <a:extLst>
+              <a:ext uri="{FF2B5EF4-FFF2-40B4-BE49-F238E27FC236}">
+                <a16:creationId xmlns:a16="http://schemas.microsoft.com/office/drawing/2014/main" id="{161D4F6F-D46F-4141-8952-AEFABB9EDDF3}"/>
+              </a:ext>
+            </a:extLst>
+          </p:cNvPr>
+          <p:cNvSpPr/>
+          <p:nvPr/>
+        </p:nvSpPr>
+        <p:spPr>
+          <a:xfrm>
+            <a:off x="687799" y="1641613"/>
             <a:ext cx="7928056" cy="2031325"/>
           </a:xfrm>
           <a:prstGeom prst="rect">
@@ -34140,7 +34676,7 @@
 </p:sld>
 </file>
 
-<file path=ppt/slides/slide27.xml><?xml version="1.0" encoding="utf-8"?>
+<file path=ppt/slides/slide28.xml><?xml version="1.0" encoding="utf-8"?>
 <p:sld xmlns:a="http://schemas.openxmlformats.org/drawingml/2006/main" xmlns:r="http://schemas.openxmlformats.org/officeDocument/2006/relationships" xmlns:p="http://schemas.openxmlformats.org/presentationml/2006/main">
   <p:cSld>
     <p:spTree>
@@ -34236,7 +34772,7 @@
             </a:pPr>
             <a:fld id="{00000000-1234-1234-1234-123412341234}" type="slidenum">
               <a:rPr lang="en-US"/>
-              <a:t>27</a:t>
+              <a:t>28</a:t>
             </a:fld>
             <a:endParaRPr/>
           </a:p>

</xml_diff>